<commit_message>
Revert "Merge remote-tracking branch 'origin/master'"
This reverts commit aabb7ae735ac346764506f2368fcbe83f145acd9, reversing
changes made to 10e703e050b90195c94d5718fcde31b3241213c6.
</commit_message>
<xml_diff>
--- a/ch0-example-queries.pptx
+++ b/ch0-example-queries.pptx
@@ -158,7 +158,7 @@
   <p:extLst>
     <p:ext uri="{521415D9-36F7-43E2-AB2F-B90AF26B5E84}">
       <p14:sectionLst xmlns:p14="http://schemas.microsoft.com/office/powerpoint/2010/main">
-        <p14:section name="Introduction" id="{90F6A542-0352-1F4E-8DEC-08A6561A4346}">
+        <p14:section name="Default Section" id="{90F6A542-0352-1F4E-8DEC-08A6561A4346}">
           <p14:sldIdLst>
             <p14:sldId id="256"/>
             <p14:sldId id="270"/>
@@ -303,7 +303,7 @@
               <a:pPr>
                 <a:defRPr/>
               </a:pPr>
-              <a:t>2016-09-24</a:t>
+              <a:t>2016-08-29</a:t>
             </a:fld>
             <a:endParaRPr lang="en-US"/>
           </a:p>
@@ -519,7 +519,7 @@
               <a:pPr>
                 <a:defRPr/>
               </a:pPr>
-              <a:t>2016-09-24</a:t>
+              <a:t>2016-08-29</a:t>
             </a:fld>
             <a:endParaRPr lang="en-US"/>
           </a:p>
@@ -899,17 +899,7 @@
             </a:pPr>
             <a:r>
               <a:rPr lang="en-US" baseline="0" dirty="0" smtClean="0"/>
-              <a:t>Markov Logic Networks can be addressed too</a:t>
-            </a:r>
-          </a:p>
-          <a:p>
-            <a:pPr marL="171450" indent="-171450">
-              <a:buFontTx/>
-              <a:buChar char="-"/>
-            </a:pPr>
-            <a:r>
-              <a:rPr lang="en-US" baseline="0" dirty="0" smtClean="0"/>
-              <a:t>total time: 220 min, 30 min break</a:t>
+              <a:t>refer to Markov Logic networks</a:t>
             </a:r>
           </a:p>
           <a:p>
@@ -1222,6 +1212,22 @@
           <a:bodyPr/>
           <a:lstStyle/>
           <a:p>
+            <a:r>
+              <a:rPr lang="en-US" dirty="0" smtClean="0"/>
+              <a:t>TODO:</a:t>
+            </a:r>
+            <a:r>
+              <a:rPr lang="en-US" baseline="0" dirty="0" smtClean="0"/>
+              <a:t> </a:t>
+            </a:r>
+            <a:r>
+              <a:rPr lang="en-US" dirty="0" smtClean="0"/>
+              <a:t>set up in standard</a:t>
+            </a:r>
+            <a:r>
+              <a:rPr lang="en-US" baseline="0" dirty="0" smtClean="0"/>
+              <a:t> Bayesian network, show query in UBC tool</a:t>
+            </a:r>
             <a:endParaRPr lang="en-US" dirty="0"/>
           </a:p>
         </p:txBody>
@@ -1503,11 +1509,25 @@
           <a:p>
             <a:r>
               <a:rPr lang="en-US" dirty="0" smtClean="0"/>
-              <a:t>in</a:t>
+              <a:t>TODO:</a:t>
             </a:r>
             <a:r>
               <a:rPr lang="en-US" baseline="0" dirty="0" smtClean="0"/>
-              <a:t> particular, generalizes to Markov Logic networks</a:t>
+              <a:t> get reference to source like </a:t>
+            </a:r>
+            <a:r>
+              <a:rPr lang="en-US" baseline="0" dirty="0" err="1" smtClean="0"/>
+              <a:t>Getoor’s</a:t>
+            </a:r>
+            <a:r>
+              <a:rPr lang="en-US" baseline="0" dirty="0" smtClean="0"/>
+              <a:t> tutorial</a:t>
+            </a:r>
+          </a:p>
+          <a:p>
+            <a:r>
+              <a:rPr lang="en-US" baseline="0" dirty="0" smtClean="0"/>
+              <a:t>Once issues are clear</a:t>
             </a:r>
             <a:endParaRPr lang="en-US" dirty="0"/>
           </a:p>
@@ -1977,7 +1997,7 @@
               <a:pPr>
                 <a:defRPr/>
               </a:pPr>
-              <a:t>2016-09-24</a:t>
+              <a:t>2016-08-29</a:t>
             </a:fld>
             <a:endParaRPr lang="en-US"/>
           </a:p>
@@ -2174,7 +2194,7 @@
               <a:pPr>
                 <a:defRPr/>
               </a:pPr>
-              <a:t>2016-09-24</a:t>
+              <a:t>2016-08-29</a:t>
             </a:fld>
             <a:endParaRPr lang="en-US"/>
           </a:p>
@@ -2385,7 +2405,7 @@
               <a:pPr>
                 <a:defRPr/>
               </a:pPr>
-              <a:t>2016-09-24</a:t>
+              <a:t>2016-08-29</a:t>
             </a:fld>
             <a:endParaRPr lang="en-US"/>
           </a:p>
@@ -2591,7 +2611,7 @@
               <a:pPr>
                 <a:defRPr/>
               </a:pPr>
-              <a:t>2016-09-24</a:t>
+              <a:t>2016-08-29</a:t>
             </a:fld>
             <a:endParaRPr lang="en-US"/>
           </a:p>
@@ -3110,7 +3130,7 @@
               <a:pPr>
                 <a:defRPr/>
               </a:pPr>
-              <a:t>2016-09-24</a:t>
+              <a:t>2016-08-29</a:t>
             </a:fld>
             <a:endParaRPr lang="en-US"/>
           </a:p>
@@ -3379,7 +3399,7 @@
               <a:pPr>
                 <a:defRPr/>
               </a:pPr>
-              <a:t>2016-09-24</a:t>
+              <a:t>2016-08-29</a:t>
             </a:fld>
             <a:endParaRPr lang="en-US"/>
           </a:p>
@@ -3777,7 +3797,7 @@
               <a:pPr>
                 <a:defRPr/>
               </a:pPr>
-              <a:t>2016-09-24</a:t>
+              <a:t>2016-08-29</a:t>
             </a:fld>
             <a:endParaRPr lang="en-US"/>
           </a:p>
@@ -3926,7 +3946,7 @@
               <a:pPr>
                 <a:defRPr/>
               </a:pPr>
-              <a:t>2016-09-24</a:t>
+              <a:t>2016-08-29</a:t>
             </a:fld>
             <a:endParaRPr lang="en-US"/>
           </a:p>
@@ -4052,7 +4072,7 @@
               <a:pPr>
                 <a:defRPr/>
               </a:pPr>
-              <a:t>2016-09-24</a:t>
+              <a:t>2016-08-29</a:t>
             </a:fld>
             <a:endParaRPr lang="en-US"/>
           </a:p>
@@ -4428,7 +4448,7 @@
               <a:pPr>
                 <a:defRPr/>
               </a:pPr>
-              <a:t>2016-09-24</a:t>
+              <a:t>2016-08-29</a:t>
             </a:fld>
             <a:endParaRPr lang="en-US"/>
           </a:p>
@@ -4851,7 +4871,7 @@
               <a:pPr>
                 <a:defRPr/>
               </a:pPr>
-              <a:t>2016-09-24</a:t>
+              <a:t>2016-08-29</a:t>
             </a:fld>
             <a:endParaRPr lang="en-US"/>
           </a:p>
@@ -5271,7 +5291,7 @@
               <a:pPr>
                 <a:defRPr/>
               </a:pPr>
-              <a:t>2016-09-24</a:t>
+              <a:t>2016-08-29</a:t>
             </a:fld>
             <a:endParaRPr lang="en-US"/>
           </a:p>
@@ -6044,80 +6064,33 @@
             <p:ph type="subTitle" idx="1"/>
           </p:nvPr>
         </p:nvSpPr>
-        <p:spPr>
-          <a:xfrm>
-            <a:off x="457200" y="3200400"/>
-            <a:ext cx="7962900" cy="2641600"/>
-          </a:xfrm>
-        </p:spPr>
+        <p:spPr/>
         <p:txBody>
           <a:bodyPr/>
           <a:lstStyle/>
           <a:p>
             <a:r>
               <a:rPr lang="en-US" dirty="0" smtClean="0"/>
-              <a:t>Tutorial Introduction</a:t>
-            </a:r>
-          </a:p>
-          <a:p>
-            <a:r>
-              <a:rPr lang="en-US" dirty="0" smtClean="0"/>
-              <a:t>Presenters: </a:t>
-            </a:r>
-            <a:r>
-              <a:rPr lang="en-US" u="sng" dirty="0" smtClean="0"/>
-              <a:t>Oliver Schulte</a:t>
-            </a:r>
-            <a:r>
-              <a:rPr lang="en-US" dirty="0" smtClean="0"/>
-              <a:t>, Ted Kirkpatrick</a:t>
-            </a:r>
-          </a:p>
-          <a:p>
-            <a:r>
-              <a:rPr lang="en-US" dirty="0" smtClean="0"/>
-              <a:t>School of Computing Science</a:t>
-            </a:r>
-          </a:p>
-          <a:p>
-            <a:r>
-              <a:rPr lang="en-US" dirty="0" smtClean="0"/>
-              <a:t>Simon Fraser University</a:t>
-            </a:r>
-          </a:p>
-          <a:p>
-            <a:r>
-              <a:rPr lang="en-US" dirty="0" smtClean="0"/>
-              <a:t>Vancouver-Burnaby, Canada</a:t>
-            </a:r>
-            <a:endParaRPr lang="en-US" dirty="0"/>
-          </a:p>
-        </p:txBody>
-      </p:sp>
-      <p:pic>
-        <p:nvPicPr>
-          <p:cNvPr id="4" name="Picture 3" descr="sfu-logo.jpg"/>
-          <p:cNvPicPr>
-            <a:picLocks noChangeAspect="1"/>
-          </p:cNvPicPr>
-          <p:nvPr/>
-        </p:nvPicPr>
-        <p:blipFill>
-          <a:blip r:embed="rId3" cstate="print"/>
-          <a:stretch>
-            <a:fillRect/>
-          </a:stretch>
-        </p:blipFill>
-        <p:spPr>
-          <a:xfrm>
-            <a:off x="3200400" y="5664200"/>
-            <a:ext cx="1844489" cy="928694"/>
-          </a:xfrm>
-          <a:prstGeom prst="rect">
-            <a:avLst/>
-          </a:prstGeom>
-        </p:spPr>
-      </p:pic>
+              <a:t>Introduction</a:t>
+            </a:r>
+          </a:p>
+          <a:p>
+            <a:r>
+              <a:rPr lang="en-US"/>
+              <a:t>Tutorial on Learning Bayesian Networks for </a:t>
+            </a:r>
+            <a:r>
+              <a:rPr lang="en-US"/>
+              <a:t>Relational </a:t>
+            </a:r>
+            <a:r>
+              <a:rPr lang="en-US" smtClean="0"/>
+              <a:t>Data</a:t>
+            </a:r>
+            <a:endParaRPr lang="en-US"/>
+          </a:p>
+        </p:txBody>
+      </p:sp>
     </p:spTree>
     <p:extLst>
       <p:ext uri="{BB962C8B-B14F-4D97-AF65-F5344CB8AC3E}">
@@ -6579,7 +6552,7 @@
             <p:ph idx="1"/>
             <p:extLst>
               <p:ext uri="{D42A27DB-BD31-4B8C-83A1-F6EECF244321}">
-                <p14:modId xmlns:p14="http://schemas.microsoft.com/office/powerpoint/2010/main" val="2120565582"/>
+                <p14:modId xmlns:p14="http://schemas.microsoft.com/office/powerpoint/2010/main" val="39466503"/>
               </p:ext>
             </p:extLst>
           </p:nvPr>
@@ -6772,7 +6745,7 @@
                         <a:rPr lang="en-US" sz="2000" dirty="0" smtClean="0">
                           <a:latin typeface="+mn-lt"/>
                         </a:rPr>
-                        <a:t>”),</a:t>
+                        <a:t>”)</a:t>
                       </a:r>
                     </a:p>
                     <a:p>
@@ -8023,12 +7996,8 @@
           </a:p>
           <a:p>
             <a:r>
-              <a:rPr lang="en-US" dirty="0"/>
-              <a:t>30 min </a:t>
-            </a:r>
-            <a:r>
               <a:rPr lang="en-US" dirty="0" smtClean="0"/>
-              <a:t>break</a:t>
+              <a:t>15 min Break </a:t>
             </a:r>
           </a:p>
           <a:p>
@@ -8764,13 +8733,6 @@
   <p:clrMapOvr>
     <a:masterClrMapping/>
   </p:clrMapOvr>
-  <p:timing>
-    <p:tnLst>
-      <p:par>
-        <p:cTn xmlns:p14="http://schemas.microsoft.com/office/powerpoint/2010/main" id="1" dur="indefinite" restart="never" nodeType="tmRoot"/>
-      </p:par>
-    </p:tnLst>
-  </p:timing>
 </p:sld>
 </file>
 
@@ -9669,13 +9631,6 @@
   <p:clrMapOvr>
     <a:masterClrMapping/>
   </p:clrMapOvr>
-  <p:timing>
-    <p:tnLst>
-      <p:par>
-        <p:cTn xmlns:p14="http://schemas.microsoft.com/office/powerpoint/2010/main" id="1" dur="indefinite" restart="never" nodeType="tmRoot"/>
-      </p:par>
-    </p:tnLst>
-  </p:timing>
 </p:sld>
 </file>
 

</xml_diff>

<commit_message>
adding new versions of first two chapters
</commit_message>
<xml_diff>
--- a/ch0-example-queries.pptx
+++ b/ch0-example-queries.pptx
@@ -158,7 +158,7 @@
   <p:extLst>
     <p:ext uri="{521415D9-36F7-43E2-AB2F-B90AF26B5E84}">
       <p14:sectionLst xmlns:p14="http://schemas.microsoft.com/office/powerpoint/2010/main">
-        <p14:section name="Default Section" id="{90F6A542-0352-1F4E-8DEC-08A6561A4346}">
+        <p14:section name="Introduction" id="{90F6A542-0352-1F4E-8DEC-08A6561A4346}">
           <p14:sldIdLst>
             <p14:sldId id="256"/>
             <p14:sldId id="270"/>
@@ -303,7 +303,7 @@
               <a:pPr>
                 <a:defRPr/>
               </a:pPr>
-              <a:t>2016-08-29</a:t>
+              <a:t>2017-01-31</a:t>
             </a:fld>
             <a:endParaRPr lang="en-US"/>
           </a:p>
@@ -519,7 +519,7 @@
               <a:pPr>
                 <a:defRPr/>
               </a:pPr>
-              <a:t>2016-08-29</a:t>
+              <a:t>2017-01-31</a:t>
             </a:fld>
             <a:endParaRPr lang="en-US"/>
           </a:p>
@@ -899,7 +899,17 @@
             </a:pPr>
             <a:r>
               <a:rPr lang="en-US" baseline="0" dirty="0" smtClean="0"/>
-              <a:t>refer to Markov Logic networks</a:t>
+              <a:t>Markov Logic Networks can be addressed too</a:t>
+            </a:r>
+          </a:p>
+          <a:p>
+            <a:pPr marL="171450" indent="-171450">
+              <a:buFontTx/>
+              <a:buChar char="-"/>
+            </a:pPr>
+            <a:r>
+              <a:rPr lang="en-US" baseline="0" dirty="0" smtClean="0"/>
+              <a:t>total time: 220 min, 30 min break</a:t>
             </a:r>
           </a:p>
           <a:p>
@@ -1212,22 +1222,6 @@
           <a:bodyPr/>
           <a:lstStyle/>
           <a:p>
-            <a:r>
-              <a:rPr lang="en-US" dirty="0" smtClean="0"/>
-              <a:t>TODO:</a:t>
-            </a:r>
-            <a:r>
-              <a:rPr lang="en-US" baseline="0" dirty="0" smtClean="0"/>
-              <a:t> </a:t>
-            </a:r>
-            <a:r>
-              <a:rPr lang="en-US" dirty="0" smtClean="0"/>
-              <a:t>set up in standard</a:t>
-            </a:r>
-            <a:r>
-              <a:rPr lang="en-US" baseline="0" dirty="0" smtClean="0"/>
-              <a:t> Bayesian network, show query in UBC tool</a:t>
-            </a:r>
             <a:endParaRPr lang="en-US" dirty="0"/>
           </a:p>
         </p:txBody>
@@ -1318,21 +1312,6 @@
           <a:bodyPr/>
           <a:lstStyle/>
           <a:p>
-            <a:r>
-              <a:rPr lang="en-US" dirty="0" smtClean="0"/>
-              <a:t>For the last query, the instance space can also be just </a:t>
-            </a:r>
-            <a:r>
-              <a:rPr lang="en-US" sz="1200" dirty="0" smtClean="0"/>
-              <a:t>since without a relationship specified, a random</a:t>
-            </a:r>
-            <a:r>
-              <a:rPr lang="en-US" sz="1200" baseline="0" dirty="0" smtClean="0"/>
-              <a:t> movie is independent of a random actor.</a:t>
-            </a:r>
-            <a:endParaRPr lang="en-US" sz="1200" dirty="0" smtClean="0"/>
-          </a:p>
-          <a:p>
             <a:endParaRPr lang="en-US" dirty="0"/>
           </a:p>
         </p:txBody>
@@ -1509,25 +1488,11 @@
           <a:p>
             <a:r>
               <a:rPr lang="en-US" dirty="0" smtClean="0"/>
-              <a:t>TODO:</a:t>
+              <a:t>in</a:t>
             </a:r>
             <a:r>
               <a:rPr lang="en-US" baseline="0" dirty="0" smtClean="0"/>
-              <a:t> get reference to source like </a:t>
-            </a:r>
-            <a:r>
-              <a:rPr lang="en-US" baseline="0" dirty="0" err="1" smtClean="0"/>
-              <a:t>Getoor’s</a:t>
-            </a:r>
-            <a:r>
-              <a:rPr lang="en-US" baseline="0" dirty="0" smtClean="0"/>
-              <a:t> tutorial</a:t>
-            </a:r>
-          </a:p>
-          <a:p>
-            <a:r>
-              <a:rPr lang="en-US" baseline="0" dirty="0" smtClean="0"/>
-              <a:t>Once issues are clear</a:t>
+              <a:t> particular, generalizes to Markov Logic networks</a:t>
             </a:r>
             <a:endParaRPr lang="en-US" dirty="0"/>
           </a:p>
@@ -1997,7 +1962,7 @@
               <a:pPr>
                 <a:defRPr/>
               </a:pPr>
-              <a:t>2016-08-29</a:t>
+              <a:t>2017-01-31</a:t>
             </a:fld>
             <a:endParaRPr lang="en-US"/>
           </a:p>
@@ -2194,7 +2159,7 @@
               <a:pPr>
                 <a:defRPr/>
               </a:pPr>
-              <a:t>2016-08-29</a:t>
+              <a:t>2017-01-31</a:t>
             </a:fld>
             <a:endParaRPr lang="en-US"/>
           </a:p>
@@ -2405,7 +2370,7 @@
               <a:pPr>
                 <a:defRPr/>
               </a:pPr>
-              <a:t>2016-08-29</a:t>
+              <a:t>2017-01-31</a:t>
             </a:fld>
             <a:endParaRPr lang="en-US"/>
           </a:p>
@@ -2611,7 +2576,7 @@
               <a:pPr>
                 <a:defRPr/>
               </a:pPr>
-              <a:t>2016-08-29</a:t>
+              <a:t>2017-01-31</a:t>
             </a:fld>
             <a:endParaRPr lang="en-US"/>
           </a:p>
@@ -3130,7 +3095,7 @@
               <a:pPr>
                 <a:defRPr/>
               </a:pPr>
-              <a:t>2016-08-29</a:t>
+              <a:t>2017-01-31</a:t>
             </a:fld>
             <a:endParaRPr lang="en-US"/>
           </a:p>
@@ -3399,7 +3364,7 @@
               <a:pPr>
                 <a:defRPr/>
               </a:pPr>
-              <a:t>2016-08-29</a:t>
+              <a:t>2017-01-31</a:t>
             </a:fld>
             <a:endParaRPr lang="en-US"/>
           </a:p>
@@ -3797,7 +3762,7 @@
               <a:pPr>
                 <a:defRPr/>
               </a:pPr>
-              <a:t>2016-08-29</a:t>
+              <a:t>2017-01-31</a:t>
             </a:fld>
             <a:endParaRPr lang="en-US"/>
           </a:p>
@@ -3946,7 +3911,7 @@
               <a:pPr>
                 <a:defRPr/>
               </a:pPr>
-              <a:t>2016-08-29</a:t>
+              <a:t>2017-01-31</a:t>
             </a:fld>
             <a:endParaRPr lang="en-US"/>
           </a:p>
@@ -4072,7 +4037,7 @@
               <a:pPr>
                 <a:defRPr/>
               </a:pPr>
-              <a:t>2016-08-29</a:t>
+              <a:t>2017-01-31</a:t>
             </a:fld>
             <a:endParaRPr lang="en-US"/>
           </a:p>
@@ -4448,7 +4413,7 @@
               <a:pPr>
                 <a:defRPr/>
               </a:pPr>
-              <a:t>2016-08-29</a:t>
+              <a:t>2017-01-31</a:t>
             </a:fld>
             <a:endParaRPr lang="en-US"/>
           </a:p>
@@ -4871,7 +4836,7 @@
               <a:pPr>
                 <a:defRPr/>
               </a:pPr>
-              <a:t>2016-08-29</a:t>
+              <a:t>2017-01-31</a:t>
             </a:fld>
             <a:endParaRPr lang="en-US"/>
           </a:p>
@@ -5291,7 +5256,7 @@
               <a:pPr>
                 <a:defRPr/>
               </a:pPr>
-              <a:t>2016-08-29</a:t>
+              <a:t>2017-01-31</a:t>
             </a:fld>
             <a:endParaRPr lang="en-US"/>
           </a:p>
@@ -6064,33 +6029,80 @@
             <p:ph type="subTitle" idx="1"/>
           </p:nvPr>
         </p:nvSpPr>
-        <p:spPr/>
+        <p:spPr>
+          <a:xfrm>
+            <a:off x="457200" y="3200400"/>
+            <a:ext cx="7962900" cy="2641600"/>
+          </a:xfrm>
+        </p:spPr>
         <p:txBody>
           <a:bodyPr/>
           <a:lstStyle/>
           <a:p>
             <a:r>
               <a:rPr lang="en-US" dirty="0" smtClean="0"/>
-              <a:t>Introduction</a:t>
-            </a:r>
-          </a:p>
-          <a:p>
-            <a:r>
-              <a:rPr lang="en-US"/>
-              <a:t>Tutorial on Learning Bayesian Networks for </a:t>
-            </a:r>
-            <a:r>
-              <a:rPr lang="en-US"/>
-              <a:t>Relational </a:t>
-            </a:r>
-            <a:r>
-              <a:rPr lang="en-US" smtClean="0"/>
-              <a:t>Data</a:t>
-            </a:r>
-            <a:endParaRPr lang="en-US"/>
-          </a:p>
-        </p:txBody>
-      </p:sp>
+              <a:t>Tutorial Introduction</a:t>
+            </a:r>
+          </a:p>
+          <a:p>
+            <a:r>
+              <a:rPr lang="en-US" dirty="0" smtClean="0"/>
+              <a:t>Presenters: </a:t>
+            </a:r>
+            <a:r>
+              <a:rPr lang="en-US" u="sng" dirty="0" smtClean="0"/>
+              <a:t>Oliver Schulte</a:t>
+            </a:r>
+            <a:r>
+              <a:rPr lang="en-US" dirty="0" smtClean="0"/>
+              <a:t>, Ted Kirkpatrick</a:t>
+            </a:r>
+          </a:p>
+          <a:p>
+            <a:r>
+              <a:rPr lang="en-US" dirty="0" smtClean="0"/>
+              <a:t>School of Computing Science</a:t>
+            </a:r>
+          </a:p>
+          <a:p>
+            <a:r>
+              <a:rPr lang="en-US" dirty="0" smtClean="0"/>
+              <a:t>Simon Fraser University</a:t>
+            </a:r>
+          </a:p>
+          <a:p>
+            <a:r>
+              <a:rPr lang="en-US" dirty="0" smtClean="0"/>
+              <a:t>Vancouver-Burnaby, Canada</a:t>
+            </a:r>
+            <a:endParaRPr lang="en-US" dirty="0"/>
+          </a:p>
+        </p:txBody>
+      </p:sp>
+      <p:pic>
+        <p:nvPicPr>
+          <p:cNvPr id="4" name="Picture 3" descr="sfu-logo.jpg"/>
+          <p:cNvPicPr>
+            <a:picLocks noChangeAspect="1"/>
+          </p:cNvPicPr>
+          <p:nvPr/>
+        </p:nvPicPr>
+        <p:blipFill>
+          <a:blip r:embed="rId3" cstate="print"/>
+          <a:stretch>
+            <a:fillRect/>
+          </a:stretch>
+        </p:blipFill>
+        <p:spPr>
+          <a:xfrm>
+            <a:off x="3200400" y="5664200"/>
+            <a:ext cx="1844489" cy="928694"/>
+          </a:xfrm>
+          <a:prstGeom prst="rect">
+            <a:avLst/>
+          </a:prstGeom>
+        </p:spPr>
+      </p:pic>
     </p:spTree>
     <p:extLst>
       <p:ext uri="{BB962C8B-B14F-4D97-AF65-F5344CB8AC3E}">
@@ -6552,7 +6564,7 @@
             <p:ph idx="1"/>
             <p:extLst>
               <p:ext uri="{D42A27DB-BD31-4B8C-83A1-F6EECF244321}">
-                <p14:modId xmlns:p14="http://schemas.microsoft.com/office/powerpoint/2010/main" val="39466503"/>
+                <p14:modId xmlns:p14="http://schemas.microsoft.com/office/powerpoint/2010/main" val="4206029436"/>
               </p:ext>
             </p:extLst>
           </p:nvPr>
@@ -6745,7 +6757,7 @@
                         <a:rPr lang="en-US" sz="2000" dirty="0" smtClean="0">
                           <a:latin typeface="+mn-lt"/>
                         </a:rPr>
-                        <a:t>”)</a:t>
+                        <a:t>”),</a:t>
                       </a:r>
                     </a:p>
                     <a:p>
@@ -7164,14 +7176,14 @@
             <p:ph idx="1"/>
             <p:extLst>
               <p:ext uri="{D42A27DB-BD31-4B8C-83A1-F6EECF244321}">
-                <p14:modId xmlns:p14="http://schemas.microsoft.com/office/powerpoint/2010/main" val="3381591003"/>
+                <p14:modId xmlns:p14="http://schemas.microsoft.com/office/powerpoint/2010/main" val="1402648410"/>
               </p:ext>
             </p:extLst>
           </p:nvPr>
         </p:nvGraphicFramePr>
         <p:xfrm>
           <a:off x="457200" y="1600200"/>
-          <a:ext cx="7666008" cy="4541520"/>
+          <a:ext cx="7666008" cy="3931920"/>
         </p:xfrm>
         <a:graphic>
           <a:graphicData uri="http://schemas.openxmlformats.org/drawingml/2006/table">
@@ -7334,7 +7346,7 @@
                         <a:rPr lang="en-US" sz="2000" baseline="0" dirty="0" smtClean="0">
                           <a:latin typeface="+mn-lt"/>
                         </a:rPr>
-                        <a:t> probability that an actor is from the US, given that she is a woman, and given that she appeared in the  movie “hate”.</a:t>
+                        <a:t> probability that an actor is from the US, given that she is a woman, and given that she appeared in the short  movie “hate”.</a:t>
                       </a:r>
                     </a:p>
                   </a:txBody>
@@ -7507,7 +7519,7 @@
                         <a:rPr lang="en-US" sz="2000" baseline="0" dirty="0" smtClean="0">
                           <a:latin typeface="+mn-lt"/>
                         </a:rPr>
-                        <a:t> probability that the actor named Actor is from the US, given that she is a woman, and given that she appeared in the long movie Movie, and did not appear in the short movie “hate”</a:t>
+                        <a:t> probability that the actor named Actor is from the US, given that she is a woman, and given that she did not appear in the short movie “hate”</a:t>
                       </a:r>
                       <a:r>
                         <a:rPr lang="en-US" sz="2000" i="0" baseline="0" dirty="0" smtClean="0">
@@ -7996,8 +8008,12 @@
           </a:p>
           <a:p>
             <a:r>
+              <a:rPr lang="en-US" dirty="0"/>
+              <a:t>30 min </a:t>
+            </a:r>
+            <a:r>
               <a:rPr lang="en-US" dirty="0" smtClean="0"/>
-              <a:t>15 min Break </a:t>
+              <a:t>break</a:t>
             </a:r>
           </a:p>
           <a:p>
@@ -8733,6 +8749,13 @@
   <p:clrMapOvr>
     <a:masterClrMapping/>
   </p:clrMapOvr>
+  <p:timing>
+    <p:tnLst>
+      <p:par>
+        <p:cTn xmlns:p14="http://schemas.microsoft.com/office/powerpoint/2010/main" id="1" dur="indefinite" restart="never" nodeType="tmRoot"/>
+      </p:par>
+    </p:tnLst>
+  </p:timing>
 </p:sld>
 </file>
 
@@ -9631,6 +9654,13 @@
   <p:clrMapOvr>
     <a:masterClrMapping/>
   </p:clrMapOvr>
+  <p:timing>
+    <p:tnLst>
+      <p:par>
+        <p:cTn xmlns:p14="http://schemas.microsoft.com/office/powerpoint/2010/main" id="1" dur="indefinite" restart="never" nodeType="tmRoot"/>
+      </p:par>
+    </p:tnLst>
+  </p:timing>
 </p:sld>
 </file>
 

</xml_diff>